<commit_message>
incorporate python_better_prog slides from @mfernandes61 into intro of day 1 and 2
</commit_message>
<xml_diff>
--- a/docs/python_debugging.pptx
+++ b/docs/python_debugging.pptx
@@ -12,7 +12,6 @@
     <p:sldId id="261" r:id="rId6"/>
     <p:sldId id="259" r:id="rId7"/>
     <p:sldId id="263" r:id="rId8"/>
-    <p:sldId id="264" r:id="rId9"/>
   </p:sldIdLst>
   <p:sldSz cx="12192000" cy="6858000"/>
   <p:notesSz cx="6858000" cy="9144000"/>
@@ -113,7 +112,7 @@
   </p:defaultTextStyle>
   <p:extLst>
     <p:ext uri="{EFAFB233-063F-42B5-8137-9DF3F51BA10A}">
-      <p15:sldGuideLst xmlns:p15="http://schemas.microsoft.com/office/powerpoint/2012/main"/>
+      <p15:sldGuideLst xmlns:p15="http://schemas.microsoft.com/office/powerpoint/2012/main" xmlns=""/>
     </p:ext>
   </p:extLst>
 </p:presentation>
@@ -141,7 +140,7 @@
           <p:cNvPr id="2" name="Title 1">
             <a:extLst>
               <a:ext uri="{FF2B5EF4-FFF2-40B4-BE49-F238E27FC236}">
-                <a16:creationId xmlns:a16="http://schemas.microsoft.com/office/drawing/2014/main" id="{B2C0A9D4-CDF0-B346-844C-934BAF02A430}"/>
+                <a16:creationId xmlns:a16="http://schemas.microsoft.com/office/drawing/2014/main" xmlns="" id="{B2C0A9D4-CDF0-B346-844C-934BAF02A430}"/>
               </a:ext>
             </a:extLst>
           </p:cNvPr>
@@ -178,7 +177,7 @@
           <p:cNvPr id="3" name="Subtitle 2">
             <a:extLst>
               <a:ext uri="{FF2B5EF4-FFF2-40B4-BE49-F238E27FC236}">
-                <a16:creationId xmlns:a16="http://schemas.microsoft.com/office/drawing/2014/main" id="{0A1D1FB0-9C61-624E-B4A1-BEA660785EE0}"/>
+                <a16:creationId xmlns:a16="http://schemas.microsoft.com/office/drawing/2014/main" xmlns="" id="{0A1D1FB0-9C61-624E-B4A1-BEA660785EE0}"/>
               </a:ext>
             </a:extLst>
           </p:cNvPr>
@@ -248,7 +247,7 @@
           <p:cNvPr id="4" name="Date Placeholder 3">
             <a:extLst>
               <a:ext uri="{FF2B5EF4-FFF2-40B4-BE49-F238E27FC236}">
-                <a16:creationId xmlns:a16="http://schemas.microsoft.com/office/drawing/2014/main" id="{4316BB08-7C2F-8440-BBBE-F6FC7C2CBE42}"/>
+                <a16:creationId xmlns:a16="http://schemas.microsoft.com/office/drawing/2014/main" xmlns="" id="{4316BB08-7C2F-8440-BBBE-F6FC7C2CBE42}"/>
               </a:ext>
             </a:extLst>
           </p:cNvPr>
@@ -266,7 +265,7 @@
           <a:p>
             <a:fld id="{36B4F50C-4D11-A04C-BF50-D57EB5FD36C8}" type="datetimeFigureOut">
               <a:rPr lang="en-US" smtClean="0"/>
-              <a:t>6/14/18</a:t>
+              <a:t>27/06/18</a:t>
             </a:fld>
             <a:endParaRPr lang="en-US"/>
           </a:p>
@@ -277,7 +276,7 @@
           <p:cNvPr id="5" name="Footer Placeholder 4">
             <a:extLst>
               <a:ext uri="{FF2B5EF4-FFF2-40B4-BE49-F238E27FC236}">
-                <a16:creationId xmlns:a16="http://schemas.microsoft.com/office/drawing/2014/main" id="{F16DC2F5-BBB4-314E-9E58-67286134E4E7}"/>
+                <a16:creationId xmlns:a16="http://schemas.microsoft.com/office/drawing/2014/main" xmlns="" id="{F16DC2F5-BBB4-314E-9E58-67286134E4E7}"/>
               </a:ext>
             </a:extLst>
           </p:cNvPr>
@@ -302,7 +301,7 @@
           <p:cNvPr id="6" name="Slide Number Placeholder 5">
             <a:extLst>
               <a:ext uri="{FF2B5EF4-FFF2-40B4-BE49-F238E27FC236}">
-                <a16:creationId xmlns:a16="http://schemas.microsoft.com/office/drawing/2014/main" id="{3AC6E727-AA26-F04A-93B9-0C3F4305C3C0}"/>
+                <a16:creationId xmlns:a16="http://schemas.microsoft.com/office/drawing/2014/main" xmlns="" id="{3AC6E727-AA26-F04A-93B9-0C3F4305C3C0}"/>
               </a:ext>
             </a:extLst>
           </p:cNvPr>
@@ -361,7 +360,7 @@
           <p:cNvPr id="2" name="Title 1">
             <a:extLst>
               <a:ext uri="{FF2B5EF4-FFF2-40B4-BE49-F238E27FC236}">
-                <a16:creationId xmlns:a16="http://schemas.microsoft.com/office/drawing/2014/main" id="{761EA756-147A-D240-8C17-1F987308349A}"/>
+                <a16:creationId xmlns:a16="http://schemas.microsoft.com/office/drawing/2014/main" xmlns="" id="{761EA756-147A-D240-8C17-1F987308349A}"/>
               </a:ext>
             </a:extLst>
           </p:cNvPr>
@@ -389,7 +388,7 @@
           <p:cNvPr id="3" name="Vertical Text Placeholder 2">
             <a:extLst>
               <a:ext uri="{FF2B5EF4-FFF2-40B4-BE49-F238E27FC236}">
-                <a16:creationId xmlns:a16="http://schemas.microsoft.com/office/drawing/2014/main" id="{74F3D0A8-49C4-1C4E-9744-5159413319AD}"/>
+                <a16:creationId xmlns:a16="http://schemas.microsoft.com/office/drawing/2014/main" xmlns="" id="{74F3D0A8-49C4-1C4E-9744-5159413319AD}"/>
               </a:ext>
             </a:extLst>
           </p:cNvPr>
@@ -446,7 +445,7 @@
           <p:cNvPr id="4" name="Date Placeholder 3">
             <a:extLst>
               <a:ext uri="{FF2B5EF4-FFF2-40B4-BE49-F238E27FC236}">
-                <a16:creationId xmlns:a16="http://schemas.microsoft.com/office/drawing/2014/main" id="{709C6188-6982-0149-971E-C13DC6726097}"/>
+                <a16:creationId xmlns:a16="http://schemas.microsoft.com/office/drawing/2014/main" xmlns="" id="{709C6188-6982-0149-971E-C13DC6726097}"/>
               </a:ext>
             </a:extLst>
           </p:cNvPr>
@@ -464,7 +463,7 @@
           <a:p>
             <a:fld id="{36B4F50C-4D11-A04C-BF50-D57EB5FD36C8}" type="datetimeFigureOut">
               <a:rPr lang="en-US" smtClean="0"/>
-              <a:t>6/14/18</a:t>
+              <a:t>27/06/18</a:t>
             </a:fld>
             <a:endParaRPr lang="en-US"/>
           </a:p>
@@ -475,7 +474,7 @@
           <p:cNvPr id="5" name="Footer Placeholder 4">
             <a:extLst>
               <a:ext uri="{FF2B5EF4-FFF2-40B4-BE49-F238E27FC236}">
-                <a16:creationId xmlns:a16="http://schemas.microsoft.com/office/drawing/2014/main" id="{F409A993-5414-0E4A-81B0-CF90CAAB204D}"/>
+                <a16:creationId xmlns:a16="http://schemas.microsoft.com/office/drawing/2014/main" xmlns="" id="{F409A993-5414-0E4A-81B0-CF90CAAB204D}"/>
               </a:ext>
             </a:extLst>
           </p:cNvPr>
@@ -500,7 +499,7 @@
           <p:cNvPr id="6" name="Slide Number Placeholder 5">
             <a:extLst>
               <a:ext uri="{FF2B5EF4-FFF2-40B4-BE49-F238E27FC236}">
-                <a16:creationId xmlns:a16="http://schemas.microsoft.com/office/drawing/2014/main" id="{AFCFF12E-F222-0F49-879A-80207AD021EC}"/>
+                <a16:creationId xmlns:a16="http://schemas.microsoft.com/office/drawing/2014/main" xmlns="" id="{AFCFF12E-F222-0F49-879A-80207AD021EC}"/>
               </a:ext>
             </a:extLst>
           </p:cNvPr>
@@ -559,7 +558,7 @@
           <p:cNvPr id="2" name="Vertical Title 1">
             <a:extLst>
               <a:ext uri="{FF2B5EF4-FFF2-40B4-BE49-F238E27FC236}">
-                <a16:creationId xmlns:a16="http://schemas.microsoft.com/office/drawing/2014/main" id="{B53541F8-08D6-7F44-B215-F2301262608D}"/>
+                <a16:creationId xmlns:a16="http://schemas.microsoft.com/office/drawing/2014/main" xmlns="" id="{B53541F8-08D6-7F44-B215-F2301262608D}"/>
               </a:ext>
             </a:extLst>
           </p:cNvPr>
@@ -592,7 +591,7 @@
           <p:cNvPr id="3" name="Vertical Text Placeholder 2">
             <a:extLst>
               <a:ext uri="{FF2B5EF4-FFF2-40B4-BE49-F238E27FC236}">
-                <a16:creationId xmlns:a16="http://schemas.microsoft.com/office/drawing/2014/main" id="{A588A22F-4FEE-FB48-9698-1D4AA35AFE0C}"/>
+                <a16:creationId xmlns:a16="http://schemas.microsoft.com/office/drawing/2014/main" xmlns="" id="{A588A22F-4FEE-FB48-9698-1D4AA35AFE0C}"/>
               </a:ext>
             </a:extLst>
           </p:cNvPr>
@@ -654,7 +653,7 @@
           <p:cNvPr id="4" name="Date Placeholder 3">
             <a:extLst>
               <a:ext uri="{FF2B5EF4-FFF2-40B4-BE49-F238E27FC236}">
-                <a16:creationId xmlns:a16="http://schemas.microsoft.com/office/drawing/2014/main" id="{40E03CB3-BECE-944E-8B09-D3BDF37F8D92}"/>
+                <a16:creationId xmlns:a16="http://schemas.microsoft.com/office/drawing/2014/main" xmlns="" id="{40E03CB3-BECE-944E-8B09-D3BDF37F8D92}"/>
               </a:ext>
             </a:extLst>
           </p:cNvPr>
@@ -672,7 +671,7 @@
           <a:p>
             <a:fld id="{36B4F50C-4D11-A04C-BF50-D57EB5FD36C8}" type="datetimeFigureOut">
               <a:rPr lang="en-US" smtClean="0"/>
-              <a:t>6/14/18</a:t>
+              <a:t>27/06/18</a:t>
             </a:fld>
             <a:endParaRPr lang="en-US"/>
           </a:p>
@@ -683,7 +682,7 @@
           <p:cNvPr id="5" name="Footer Placeholder 4">
             <a:extLst>
               <a:ext uri="{FF2B5EF4-FFF2-40B4-BE49-F238E27FC236}">
-                <a16:creationId xmlns:a16="http://schemas.microsoft.com/office/drawing/2014/main" id="{0C1D3467-EA4E-AB4D-87CC-3165249C0190}"/>
+                <a16:creationId xmlns:a16="http://schemas.microsoft.com/office/drawing/2014/main" xmlns="" id="{0C1D3467-EA4E-AB4D-87CC-3165249C0190}"/>
               </a:ext>
             </a:extLst>
           </p:cNvPr>
@@ -708,7 +707,7 @@
           <p:cNvPr id="6" name="Slide Number Placeholder 5">
             <a:extLst>
               <a:ext uri="{FF2B5EF4-FFF2-40B4-BE49-F238E27FC236}">
-                <a16:creationId xmlns:a16="http://schemas.microsoft.com/office/drawing/2014/main" id="{C83E8266-2D44-8141-B3BC-F88327A156AD}"/>
+                <a16:creationId xmlns:a16="http://schemas.microsoft.com/office/drawing/2014/main" xmlns="" id="{C83E8266-2D44-8141-B3BC-F88327A156AD}"/>
               </a:ext>
             </a:extLst>
           </p:cNvPr>
@@ -767,7 +766,7 @@
           <p:cNvPr id="2" name="Title 1">
             <a:extLst>
               <a:ext uri="{FF2B5EF4-FFF2-40B4-BE49-F238E27FC236}">
-                <a16:creationId xmlns:a16="http://schemas.microsoft.com/office/drawing/2014/main" id="{9CE92F0C-5B62-DE44-8397-9E298C27E6F5}"/>
+                <a16:creationId xmlns:a16="http://schemas.microsoft.com/office/drawing/2014/main" xmlns="" id="{9CE92F0C-5B62-DE44-8397-9E298C27E6F5}"/>
               </a:ext>
             </a:extLst>
           </p:cNvPr>
@@ -795,7 +794,7 @@
           <p:cNvPr id="3" name="Content Placeholder 2">
             <a:extLst>
               <a:ext uri="{FF2B5EF4-FFF2-40B4-BE49-F238E27FC236}">
-                <a16:creationId xmlns:a16="http://schemas.microsoft.com/office/drawing/2014/main" id="{347B090D-EA16-B544-A7A8-007FE90A2674}"/>
+                <a16:creationId xmlns:a16="http://schemas.microsoft.com/office/drawing/2014/main" xmlns="" id="{347B090D-EA16-B544-A7A8-007FE90A2674}"/>
               </a:ext>
             </a:extLst>
           </p:cNvPr>
@@ -852,7 +851,7 @@
           <p:cNvPr id="4" name="Date Placeholder 3">
             <a:extLst>
               <a:ext uri="{FF2B5EF4-FFF2-40B4-BE49-F238E27FC236}">
-                <a16:creationId xmlns:a16="http://schemas.microsoft.com/office/drawing/2014/main" id="{D21A156D-C11B-664A-B7FB-998520EE6D99}"/>
+                <a16:creationId xmlns:a16="http://schemas.microsoft.com/office/drawing/2014/main" xmlns="" id="{D21A156D-C11B-664A-B7FB-998520EE6D99}"/>
               </a:ext>
             </a:extLst>
           </p:cNvPr>
@@ -870,7 +869,7 @@
           <a:p>
             <a:fld id="{36B4F50C-4D11-A04C-BF50-D57EB5FD36C8}" type="datetimeFigureOut">
               <a:rPr lang="en-US" smtClean="0"/>
-              <a:t>6/14/18</a:t>
+              <a:t>27/06/18</a:t>
             </a:fld>
             <a:endParaRPr lang="en-US"/>
           </a:p>
@@ -881,7 +880,7 @@
           <p:cNvPr id="5" name="Footer Placeholder 4">
             <a:extLst>
               <a:ext uri="{FF2B5EF4-FFF2-40B4-BE49-F238E27FC236}">
-                <a16:creationId xmlns:a16="http://schemas.microsoft.com/office/drawing/2014/main" id="{02208828-C9E5-804F-AD17-F2DDBD9A0EAA}"/>
+                <a16:creationId xmlns:a16="http://schemas.microsoft.com/office/drawing/2014/main" xmlns="" id="{02208828-C9E5-804F-AD17-F2DDBD9A0EAA}"/>
               </a:ext>
             </a:extLst>
           </p:cNvPr>
@@ -906,7 +905,7 @@
           <p:cNvPr id="6" name="Slide Number Placeholder 5">
             <a:extLst>
               <a:ext uri="{FF2B5EF4-FFF2-40B4-BE49-F238E27FC236}">
-                <a16:creationId xmlns:a16="http://schemas.microsoft.com/office/drawing/2014/main" id="{1BF6A04C-D5A5-A74B-93A6-CCF8C7EEFC87}"/>
+                <a16:creationId xmlns:a16="http://schemas.microsoft.com/office/drawing/2014/main" xmlns="" id="{1BF6A04C-D5A5-A74B-93A6-CCF8C7EEFC87}"/>
               </a:ext>
             </a:extLst>
           </p:cNvPr>
@@ -965,7 +964,7 @@
           <p:cNvPr id="2" name="Title 1">
             <a:extLst>
               <a:ext uri="{FF2B5EF4-FFF2-40B4-BE49-F238E27FC236}">
-                <a16:creationId xmlns:a16="http://schemas.microsoft.com/office/drawing/2014/main" id="{79887137-6B5A-9B43-BDCA-FB65D0155CD9}"/>
+                <a16:creationId xmlns:a16="http://schemas.microsoft.com/office/drawing/2014/main" xmlns="" id="{79887137-6B5A-9B43-BDCA-FB65D0155CD9}"/>
               </a:ext>
             </a:extLst>
           </p:cNvPr>
@@ -1002,7 +1001,7 @@
           <p:cNvPr id="3" name="Text Placeholder 2">
             <a:extLst>
               <a:ext uri="{FF2B5EF4-FFF2-40B4-BE49-F238E27FC236}">
-                <a16:creationId xmlns:a16="http://schemas.microsoft.com/office/drawing/2014/main" id="{10621640-2E8F-B440-BB56-D7D4418EDCCE}"/>
+                <a16:creationId xmlns:a16="http://schemas.microsoft.com/office/drawing/2014/main" xmlns="" id="{10621640-2E8F-B440-BB56-D7D4418EDCCE}"/>
               </a:ext>
             </a:extLst>
           </p:cNvPr>
@@ -1127,7 +1126,7 @@
           <p:cNvPr id="4" name="Date Placeholder 3">
             <a:extLst>
               <a:ext uri="{FF2B5EF4-FFF2-40B4-BE49-F238E27FC236}">
-                <a16:creationId xmlns:a16="http://schemas.microsoft.com/office/drawing/2014/main" id="{E067A96D-20FC-B24D-B814-712A092D6D8C}"/>
+                <a16:creationId xmlns:a16="http://schemas.microsoft.com/office/drawing/2014/main" xmlns="" id="{E067A96D-20FC-B24D-B814-712A092D6D8C}"/>
               </a:ext>
             </a:extLst>
           </p:cNvPr>
@@ -1145,7 +1144,7 @@
           <a:p>
             <a:fld id="{36B4F50C-4D11-A04C-BF50-D57EB5FD36C8}" type="datetimeFigureOut">
               <a:rPr lang="en-US" smtClean="0"/>
-              <a:t>6/14/18</a:t>
+              <a:t>27/06/18</a:t>
             </a:fld>
             <a:endParaRPr lang="en-US"/>
           </a:p>
@@ -1156,7 +1155,7 @@
           <p:cNvPr id="5" name="Footer Placeholder 4">
             <a:extLst>
               <a:ext uri="{FF2B5EF4-FFF2-40B4-BE49-F238E27FC236}">
-                <a16:creationId xmlns:a16="http://schemas.microsoft.com/office/drawing/2014/main" id="{C7E994A6-79AD-5244-BD4D-9A97E609EA43}"/>
+                <a16:creationId xmlns:a16="http://schemas.microsoft.com/office/drawing/2014/main" xmlns="" id="{C7E994A6-79AD-5244-BD4D-9A97E609EA43}"/>
               </a:ext>
             </a:extLst>
           </p:cNvPr>
@@ -1181,7 +1180,7 @@
           <p:cNvPr id="6" name="Slide Number Placeholder 5">
             <a:extLst>
               <a:ext uri="{FF2B5EF4-FFF2-40B4-BE49-F238E27FC236}">
-                <a16:creationId xmlns:a16="http://schemas.microsoft.com/office/drawing/2014/main" id="{27B58DA6-06C6-4942-8E63-33FC9DF413F1}"/>
+                <a16:creationId xmlns:a16="http://schemas.microsoft.com/office/drawing/2014/main" xmlns="" id="{27B58DA6-06C6-4942-8E63-33FC9DF413F1}"/>
               </a:ext>
             </a:extLst>
           </p:cNvPr>
@@ -1240,7 +1239,7 @@
           <p:cNvPr id="2" name="Title 1">
             <a:extLst>
               <a:ext uri="{FF2B5EF4-FFF2-40B4-BE49-F238E27FC236}">
-                <a16:creationId xmlns:a16="http://schemas.microsoft.com/office/drawing/2014/main" id="{749DAE2F-FAC2-F64A-AE49-B9188FC54AA6}"/>
+                <a16:creationId xmlns:a16="http://schemas.microsoft.com/office/drawing/2014/main" xmlns="" id="{749DAE2F-FAC2-F64A-AE49-B9188FC54AA6}"/>
               </a:ext>
             </a:extLst>
           </p:cNvPr>
@@ -1268,7 +1267,7 @@
           <p:cNvPr id="3" name="Content Placeholder 2">
             <a:extLst>
               <a:ext uri="{FF2B5EF4-FFF2-40B4-BE49-F238E27FC236}">
-                <a16:creationId xmlns:a16="http://schemas.microsoft.com/office/drawing/2014/main" id="{85C7B877-D1A1-7243-8A34-EC1A3477A912}"/>
+                <a16:creationId xmlns:a16="http://schemas.microsoft.com/office/drawing/2014/main" xmlns="" id="{85C7B877-D1A1-7243-8A34-EC1A3477A912}"/>
               </a:ext>
             </a:extLst>
           </p:cNvPr>
@@ -1330,7 +1329,7 @@
           <p:cNvPr id="4" name="Content Placeholder 3">
             <a:extLst>
               <a:ext uri="{FF2B5EF4-FFF2-40B4-BE49-F238E27FC236}">
-                <a16:creationId xmlns:a16="http://schemas.microsoft.com/office/drawing/2014/main" id="{9F4C158B-F17B-5E4A-8C28-72885CB1B153}"/>
+                <a16:creationId xmlns:a16="http://schemas.microsoft.com/office/drawing/2014/main" xmlns="" id="{9F4C158B-F17B-5E4A-8C28-72885CB1B153}"/>
               </a:ext>
             </a:extLst>
           </p:cNvPr>
@@ -1392,7 +1391,7 @@
           <p:cNvPr id="5" name="Date Placeholder 4">
             <a:extLst>
               <a:ext uri="{FF2B5EF4-FFF2-40B4-BE49-F238E27FC236}">
-                <a16:creationId xmlns:a16="http://schemas.microsoft.com/office/drawing/2014/main" id="{93694742-2C03-1548-BE3D-0639A3457DED}"/>
+                <a16:creationId xmlns:a16="http://schemas.microsoft.com/office/drawing/2014/main" xmlns="" id="{93694742-2C03-1548-BE3D-0639A3457DED}"/>
               </a:ext>
             </a:extLst>
           </p:cNvPr>
@@ -1410,7 +1409,7 @@
           <a:p>
             <a:fld id="{36B4F50C-4D11-A04C-BF50-D57EB5FD36C8}" type="datetimeFigureOut">
               <a:rPr lang="en-US" smtClean="0"/>
-              <a:t>6/14/18</a:t>
+              <a:t>27/06/18</a:t>
             </a:fld>
             <a:endParaRPr lang="en-US"/>
           </a:p>
@@ -1421,7 +1420,7 @@
           <p:cNvPr id="6" name="Footer Placeholder 5">
             <a:extLst>
               <a:ext uri="{FF2B5EF4-FFF2-40B4-BE49-F238E27FC236}">
-                <a16:creationId xmlns:a16="http://schemas.microsoft.com/office/drawing/2014/main" id="{1DFB3D91-0B4F-4E45-87E4-96D54F69214E}"/>
+                <a16:creationId xmlns:a16="http://schemas.microsoft.com/office/drawing/2014/main" xmlns="" id="{1DFB3D91-0B4F-4E45-87E4-96D54F69214E}"/>
               </a:ext>
             </a:extLst>
           </p:cNvPr>
@@ -1446,7 +1445,7 @@
           <p:cNvPr id="7" name="Slide Number Placeholder 6">
             <a:extLst>
               <a:ext uri="{FF2B5EF4-FFF2-40B4-BE49-F238E27FC236}">
-                <a16:creationId xmlns:a16="http://schemas.microsoft.com/office/drawing/2014/main" id="{1737B877-8CEE-C549-8B30-A9AD857AE3A9}"/>
+                <a16:creationId xmlns:a16="http://schemas.microsoft.com/office/drawing/2014/main" xmlns="" id="{1737B877-8CEE-C549-8B30-A9AD857AE3A9}"/>
               </a:ext>
             </a:extLst>
           </p:cNvPr>
@@ -1505,7 +1504,7 @@
           <p:cNvPr id="2" name="Title 1">
             <a:extLst>
               <a:ext uri="{FF2B5EF4-FFF2-40B4-BE49-F238E27FC236}">
-                <a16:creationId xmlns:a16="http://schemas.microsoft.com/office/drawing/2014/main" id="{E6C3B5D3-6A8C-C345-9C3D-F822496971E7}"/>
+                <a16:creationId xmlns:a16="http://schemas.microsoft.com/office/drawing/2014/main" xmlns="" id="{E6C3B5D3-6A8C-C345-9C3D-F822496971E7}"/>
               </a:ext>
             </a:extLst>
           </p:cNvPr>
@@ -1538,7 +1537,7 @@
           <p:cNvPr id="3" name="Text Placeholder 2">
             <a:extLst>
               <a:ext uri="{FF2B5EF4-FFF2-40B4-BE49-F238E27FC236}">
-                <a16:creationId xmlns:a16="http://schemas.microsoft.com/office/drawing/2014/main" id="{89D20218-891E-3040-9BBA-43EEAE6B3422}"/>
+                <a16:creationId xmlns:a16="http://schemas.microsoft.com/office/drawing/2014/main" xmlns="" id="{89D20218-891E-3040-9BBA-43EEAE6B3422}"/>
               </a:ext>
             </a:extLst>
           </p:cNvPr>
@@ -1609,7 +1608,7 @@
           <p:cNvPr id="4" name="Content Placeholder 3">
             <a:extLst>
               <a:ext uri="{FF2B5EF4-FFF2-40B4-BE49-F238E27FC236}">
-                <a16:creationId xmlns:a16="http://schemas.microsoft.com/office/drawing/2014/main" id="{D95F8F35-5B8B-284D-AB7A-A37239708334}"/>
+                <a16:creationId xmlns:a16="http://schemas.microsoft.com/office/drawing/2014/main" xmlns="" id="{D95F8F35-5B8B-284D-AB7A-A37239708334}"/>
               </a:ext>
             </a:extLst>
           </p:cNvPr>
@@ -1671,7 +1670,7 @@
           <p:cNvPr id="5" name="Text Placeholder 4">
             <a:extLst>
               <a:ext uri="{FF2B5EF4-FFF2-40B4-BE49-F238E27FC236}">
-                <a16:creationId xmlns:a16="http://schemas.microsoft.com/office/drawing/2014/main" id="{3121331D-5155-F04B-9BFD-73EF8D50740E}"/>
+                <a16:creationId xmlns:a16="http://schemas.microsoft.com/office/drawing/2014/main" xmlns="" id="{3121331D-5155-F04B-9BFD-73EF8D50740E}"/>
               </a:ext>
             </a:extLst>
           </p:cNvPr>
@@ -1742,7 +1741,7 @@
           <p:cNvPr id="6" name="Content Placeholder 5">
             <a:extLst>
               <a:ext uri="{FF2B5EF4-FFF2-40B4-BE49-F238E27FC236}">
-                <a16:creationId xmlns:a16="http://schemas.microsoft.com/office/drawing/2014/main" id="{56286860-EDF0-824F-8107-D71DE2DFC035}"/>
+                <a16:creationId xmlns:a16="http://schemas.microsoft.com/office/drawing/2014/main" xmlns="" id="{56286860-EDF0-824F-8107-D71DE2DFC035}"/>
               </a:ext>
             </a:extLst>
           </p:cNvPr>
@@ -1804,7 +1803,7 @@
           <p:cNvPr id="7" name="Date Placeholder 6">
             <a:extLst>
               <a:ext uri="{FF2B5EF4-FFF2-40B4-BE49-F238E27FC236}">
-                <a16:creationId xmlns:a16="http://schemas.microsoft.com/office/drawing/2014/main" id="{BE1A016E-EB67-ED4D-ADFB-058886F3AB1D}"/>
+                <a16:creationId xmlns:a16="http://schemas.microsoft.com/office/drawing/2014/main" xmlns="" id="{BE1A016E-EB67-ED4D-ADFB-058886F3AB1D}"/>
               </a:ext>
             </a:extLst>
           </p:cNvPr>
@@ -1822,7 +1821,7 @@
           <a:p>
             <a:fld id="{36B4F50C-4D11-A04C-BF50-D57EB5FD36C8}" type="datetimeFigureOut">
               <a:rPr lang="en-US" smtClean="0"/>
-              <a:t>6/14/18</a:t>
+              <a:t>27/06/18</a:t>
             </a:fld>
             <a:endParaRPr lang="en-US"/>
           </a:p>
@@ -1833,7 +1832,7 @@
           <p:cNvPr id="8" name="Footer Placeholder 7">
             <a:extLst>
               <a:ext uri="{FF2B5EF4-FFF2-40B4-BE49-F238E27FC236}">
-                <a16:creationId xmlns:a16="http://schemas.microsoft.com/office/drawing/2014/main" id="{145306B7-9DB6-FA48-A6BF-86729CFA3BBA}"/>
+                <a16:creationId xmlns:a16="http://schemas.microsoft.com/office/drawing/2014/main" xmlns="" id="{145306B7-9DB6-FA48-A6BF-86729CFA3BBA}"/>
               </a:ext>
             </a:extLst>
           </p:cNvPr>
@@ -1858,7 +1857,7 @@
           <p:cNvPr id="9" name="Slide Number Placeholder 8">
             <a:extLst>
               <a:ext uri="{FF2B5EF4-FFF2-40B4-BE49-F238E27FC236}">
-                <a16:creationId xmlns:a16="http://schemas.microsoft.com/office/drawing/2014/main" id="{394B5BAA-A110-FB48-81A6-DC1A58DD4411}"/>
+                <a16:creationId xmlns:a16="http://schemas.microsoft.com/office/drawing/2014/main" xmlns="" id="{394B5BAA-A110-FB48-81A6-DC1A58DD4411}"/>
               </a:ext>
             </a:extLst>
           </p:cNvPr>
@@ -1917,7 +1916,7 @@
           <p:cNvPr id="2" name="Title 1">
             <a:extLst>
               <a:ext uri="{FF2B5EF4-FFF2-40B4-BE49-F238E27FC236}">
-                <a16:creationId xmlns:a16="http://schemas.microsoft.com/office/drawing/2014/main" id="{652C0EE1-F78C-7244-8296-D609B38E886E}"/>
+                <a16:creationId xmlns:a16="http://schemas.microsoft.com/office/drawing/2014/main" xmlns="" id="{652C0EE1-F78C-7244-8296-D609B38E886E}"/>
               </a:ext>
             </a:extLst>
           </p:cNvPr>
@@ -1945,7 +1944,7 @@
           <p:cNvPr id="3" name="Date Placeholder 2">
             <a:extLst>
               <a:ext uri="{FF2B5EF4-FFF2-40B4-BE49-F238E27FC236}">
-                <a16:creationId xmlns:a16="http://schemas.microsoft.com/office/drawing/2014/main" id="{7D4FFECE-A4CE-C149-9F15-A49E4D2E4991}"/>
+                <a16:creationId xmlns:a16="http://schemas.microsoft.com/office/drawing/2014/main" xmlns="" id="{7D4FFECE-A4CE-C149-9F15-A49E4D2E4991}"/>
               </a:ext>
             </a:extLst>
           </p:cNvPr>
@@ -1963,7 +1962,7 @@
           <a:p>
             <a:fld id="{36B4F50C-4D11-A04C-BF50-D57EB5FD36C8}" type="datetimeFigureOut">
               <a:rPr lang="en-US" smtClean="0"/>
-              <a:t>6/14/18</a:t>
+              <a:t>27/06/18</a:t>
             </a:fld>
             <a:endParaRPr lang="en-US"/>
           </a:p>
@@ -1974,7 +1973,7 @@
           <p:cNvPr id="4" name="Footer Placeholder 3">
             <a:extLst>
               <a:ext uri="{FF2B5EF4-FFF2-40B4-BE49-F238E27FC236}">
-                <a16:creationId xmlns:a16="http://schemas.microsoft.com/office/drawing/2014/main" id="{4D965AAA-4477-3B42-800A-E3F35F7BCED6}"/>
+                <a16:creationId xmlns:a16="http://schemas.microsoft.com/office/drawing/2014/main" xmlns="" id="{4D965AAA-4477-3B42-800A-E3F35F7BCED6}"/>
               </a:ext>
             </a:extLst>
           </p:cNvPr>
@@ -1999,7 +1998,7 @@
           <p:cNvPr id="5" name="Slide Number Placeholder 4">
             <a:extLst>
               <a:ext uri="{FF2B5EF4-FFF2-40B4-BE49-F238E27FC236}">
-                <a16:creationId xmlns:a16="http://schemas.microsoft.com/office/drawing/2014/main" id="{DE2BFFBB-A0F2-3A47-AF9C-0B21E8219586}"/>
+                <a16:creationId xmlns:a16="http://schemas.microsoft.com/office/drawing/2014/main" xmlns="" id="{DE2BFFBB-A0F2-3A47-AF9C-0B21E8219586}"/>
               </a:ext>
             </a:extLst>
           </p:cNvPr>
@@ -2058,7 +2057,7 @@
           <p:cNvPr id="2" name="Date Placeholder 1">
             <a:extLst>
               <a:ext uri="{FF2B5EF4-FFF2-40B4-BE49-F238E27FC236}">
-                <a16:creationId xmlns:a16="http://schemas.microsoft.com/office/drawing/2014/main" id="{C7F7900E-5565-5D4F-B89A-FF0783D15A6A}"/>
+                <a16:creationId xmlns:a16="http://schemas.microsoft.com/office/drawing/2014/main" xmlns="" id="{C7F7900E-5565-5D4F-B89A-FF0783D15A6A}"/>
               </a:ext>
             </a:extLst>
           </p:cNvPr>
@@ -2076,7 +2075,7 @@
           <a:p>
             <a:fld id="{36B4F50C-4D11-A04C-BF50-D57EB5FD36C8}" type="datetimeFigureOut">
               <a:rPr lang="en-US" smtClean="0"/>
-              <a:t>6/14/18</a:t>
+              <a:t>27/06/18</a:t>
             </a:fld>
             <a:endParaRPr lang="en-US"/>
           </a:p>
@@ -2087,7 +2086,7 @@
           <p:cNvPr id="3" name="Footer Placeholder 2">
             <a:extLst>
               <a:ext uri="{FF2B5EF4-FFF2-40B4-BE49-F238E27FC236}">
-                <a16:creationId xmlns:a16="http://schemas.microsoft.com/office/drawing/2014/main" id="{757CEBBE-4F44-AF47-9ECB-6EC3C1AA6ABD}"/>
+                <a16:creationId xmlns:a16="http://schemas.microsoft.com/office/drawing/2014/main" xmlns="" id="{757CEBBE-4F44-AF47-9ECB-6EC3C1AA6ABD}"/>
               </a:ext>
             </a:extLst>
           </p:cNvPr>
@@ -2112,7 +2111,7 @@
           <p:cNvPr id="4" name="Slide Number Placeholder 3">
             <a:extLst>
               <a:ext uri="{FF2B5EF4-FFF2-40B4-BE49-F238E27FC236}">
-                <a16:creationId xmlns:a16="http://schemas.microsoft.com/office/drawing/2014/main" id="{8C6E7648-C88A-334F-A2A7-77FC857425C0}"/>
+                <a16:creationId xmlns:a16="http://schemas.microsoft.com/office/drawing/2014/main" xmlns="" id="{8C6E7648-C88A-334F-A2A7-77FC857425C0}"/>
               </a:ext>
             </a:extLst>
           </p:cNvPr>
@@ -2171,7 +2170,7 @@
           <p:cNvPr id="2" name="Title 1">
             <a:extLst>
               <a:ext uri="{FF2B5EF4-FFF2-40B4-BE49-F238E27FC236}">
-                <a16:creationId xmlns:a16="http://schemas.microsoft.com/office/drawing/2014/main" id="{F93211BC-FB76-B248-ABF1-0B9A99441AB8}"/>
+                <a16:creationId xmlns:a16="http://schemas.microsoft.com/office/drawing/2014/main" xmlns="" id="{F93211BC-FB76-B248-ABF1-0B9A99441AB8}"/>
               </a:ext>
             </a:extLst>
           </p:cNvPr>
@@ -2208,7 +2207,7 @@
           <p:cNvPr id="3" name="Content Placeholder 2">
             <a:extLst>
               <a:ext uri="{FF2B5EF4-FFF2-40B4-BE49-F238E27FC236}">
-                <a16:creationId xmlns:a16="http://schemas.microsoft.com/office/drawing/2014/main" id="{09075DFE-796E-B244-B9A2-9CCA2955C473}"/>
+                <a16:creationId xmlns:a16="http://schemas.microsoft.com/office/drawing/2014/main" xmlns="" id="{09075DFE-796E-B244-B9A2-9CCA2955C473}"/>
               </a:ext>
             </a:extLst>
           </p:cNvPr>
@@ -2298,7 +2297,7 @@
           <p:cNvPr id="4" name="Text Placeholder 3">
             <a:extLst>
               <a:ext uri="{FF2B5EF4-FFF2-40B4-BE49-F238E27FC236}">
-                <a16:creationId xmlns:a16="http://schemas.microsoft.com/office/drawing/2014/main" id="{BEA991A7-EFD2-5441-A118-0873BD94D905}"/>
+                <a16:creationId xmlns:a16="http://schemas.microsoft.com/office/drawing/2014/main" xmlns="" id="{BEA991A7-EFD2-5441-A118-0873BD94D905}"/>
               </a:ext>
             </a:extLst>
           </p:cNvPr>
@@ -2369,7 +2368,7 @@
           <p:cNvPr id="5" name="Date Placeholder 4">
             <a:extLst>
               <a:ext uri="{FF2B5EF4-FFF2-40B4-BE49-F238E27FC236}">
-                <a16:creationId xmlns:a16="http://schemas.microsoft.com/office/drawing/2014/main" id="{8AFDBFE9-2D46-244F-A215-C74AB9B83804}"/>
+                <a16:creationId xmlns:a16="http://schemas.microsoft.com/office/drawing/2014/main" xmlns="" id="{8AFDBFE9-2D46-244F-A215-C74AB9B83804}"/>
               </a:ext>
             </a:extLst>
           </p:cNvPr>
@@ -2387,7 +2386,7 @@
           <a:p>
             <a:fld id="{36B4F50C-4D11-A04C-BF50-D57EB5FD36C8}" type="datetimeFigureOut">
               <a:rPr lang="en-US" smtClean="0"/>
-              <a:t>6/14/18</a:t>
+              <a:t>27/06/18</a:t>
             </a:fld>
             <a:endParaRPr lang="en-US"/>
           </a:p>
@@ -2398,7 +2397,7 @@
           <p:cNvPr id="6" name="Footer Placeholder 5">
             <a:extLst>
               <a:ext uri="{FF2B5EF4-FFF2-40B4-BE49-F238E27FC236}">
-                <a16:creationId xmlns:a16="http://schemas.microsoft.com/office/drawing/2014/main" id="{2A7C5B4C-7AED-074B-9CDA-EE90F014A305}"/>
+                <a16:creationId xmlns:a16="http://schemas.microsoft.com/office/drawing/2014/main" xmlns="" id="{2A7C5B4C-7AED-074B-9CDA-EE90F014A305}"/>
               </a:ext>
             </a:extLst>
           </p:cNvPr>
@@ -2423,7 +2422,7 @@
           <p:cNvPr id="7" name="Slide Number Placeholder 6">
             <a:extLst>
               <a:ext uri="{FF2B5EF4-FFF2-40B4-BE49-F238E27FC236}">
-                <a16:creationId xmlns:a16="http://schemas.microsoft.com/office/drawing/2014/main" id="{80E3DD52-3B5F-AB40-84C0-0A448C1ADCBF}"/>
+                <a16:creationId xmlns:a16="http://schemas.microsoft.com/office/drawing/2014/main" xmlns="" id="{80E3DD52-3B5F-AB40-84C0-0A448C1ADCBF}"/>
               </a:ext>
             </a:extLst>
           </p:cNvPr>
@@ -2482,7 +2481,7 @@
           <p:cNvPr id="2" name="Title 1">
             <a:extLst>
               <a:ext uri="{FF2B5EF4-FFF2-40B4-BE49-F238E27FC236}">
-                <a16:creationId xmlns:a16="http://schemas.microsoft.com/office/drawing/2014/main" id="{252E9473-0D8F-4541-A26B-D3AEAE2282BA}"/>
+                <a16:creationId xmlns:a16="http://schemas.microsoft.com/office/drawing/2014/main" xmlns="" id="{252E9473-0D8F-4541-A26B-D3AEAE2282BA}"/>
               </a:ext>
             </a:extLst>
           </p:cNvPr>
@@ -2519,7 +2518,7 @@
           <p:cNvPr id="3" name="Picture Placeholder 2">
             <a:extLst>
               <a:ext uri="{FF2B5EF4-FFF2-40B4-BE49-F238E27FC236}">
-                <a16:creationId xmlns:a16="http://schemas.microsoft.com/office/drawing/2014/main" id="{72140D06-4F60-FC48-8BF5-77DCBB4F31C2}"/>
+                <a16:creationId xmlns:a16="http://schemas.microsoft.com/office/drawing/2014/main" xmlns="" id="{72140D06-4F60-FC48-8BF5-77DCBB4F31C2}"/>
               </a:ext>
             </a:extLst>
           </p:cNvPr>
@@ -2586,7 +2585,7 @@
           <p:cNvPr id="4" name="Text Placeholder 3">
             <a:extLst>
               <a:ext uri="{FF2B5EF4-FFF2-40B4-BE49-F238E27FC236}">
-                <a16:creationId xmlns:a16="http://schemas.microsoft.com/office/drawing/2014/main" id="{CDA9961B-BEEF-434E-973B-59F6EA028C1A}"/>
+                <a16:creationId xmlns:a16="http://schemas.microsoft.com/office/drawing/2014/main" xmlns="" id="{CDA9961B-BEEF-434E-973B-59F6EA028C1A}"/>
               </a:ext>
             </a:extLst>
           </p:cNvPr>
@@ -2657,7 +2656,7 @@
           <p:cNvPr id="5" name="Date Placeholder 4">
             <a:extLst>
               <a:ext uri="{FF2B5EF4-FFF2-40B4-BE49-F238E27FC236}">
-                <a16:creationId xmlns:a16="http://schemas.microsoft.com/office/drawing/2014/main" id="{351F4C11-ED00-5945-8EBD-88739C8DF8CB}"/>
+                <a16:creationId xmlns:a16="http://schemas.microsoft.com/office/drawing/2014/main" xmlns="" id="{351F4C11-ED00-5945-8EBD-88739C8DF8CB}"/>
               </a:ext>
             </a:extLst>
           </p:cNvPr>
@@ -2675,7 +2674,7 @@
           <a:p>
             <a:fld id="{36B4F50C-4D11-A04C-BF50-D57EB5FD36C8}" type="datetimeFigureOut">
               <a:rPr lang="en-US" smtClean="0"/>
-              <a:t>6/14/18</a:t>
+              <a:t>27/06/18</a:t>
             </a:fld>
             <a:endParaRPr lang="en-US"/>
           </a:p>
@@ -2686,7 +2685,7 @@
           <p:cNvPr id="6" name="Footer Placeholder 5">
             <a:extLst>
               <a:ext uri="{FF2B5EF4-FFF2-40B4-BE49-F238E27FC236}">
-                <a16:creationId xmlns:a16="http://schemas.microsoft.com/office/drawing/2014/main" id="{E9AF4B63-FDC3-444C-9DCA-E0DFCF2B0707}"/>
+                <a16:creationId xmlns:a16="http://schemas.microsoft.com/office/drawing/2014/main" xmlns="" id="{E9AF4B63-FDC3-444C-9DCA-E0DFCF2B0707}"/>
               </a:ext>
             </a:extLst>
           </p:cNvPr>
@@ -2711,7 +2710,7 @@
           <p:cNvPr id="7" name="Slide Number Placeholder 6">
             <a:extLst>
               <a:ext uri="{FF2B5EF4-FFF2-40B4-BE49-F238E27FC236}">
-                <a16:creationId xmlns:a16="http://schemas.microsoft.com/office/drawing/2014/main" id="{E8064934-7C33-0742-9EEF-34A85D6841A0}"/>
+                <a16:creationId xmlns:a16="http://schemas.microsoft.com/office/drawing/2014/main" xmlns="" id="{E8064934-7C33-0742-9EEF-34A85D6841A0}"/>
               </a:ext>
             </a:extLst>
           </p:cNvPr>
@@ -2775,7 +2774,7 @@
           <p:cNvPr id="2" name="Title Placeholder 1">
             <a:extLst>
               <a:ext uri="{FF2B5EF4-FFF2-40B4-BE49-F238E27FC236}">
-                <a16:creationId xmlns:a16="http://schemas.microsoft.com/office/drawing/2014/main" id="{5EC5D1EB-D1D7-3940-BDF3-7764CE42BD62}"/>
+                <a16:creationId xmlns:a16="http://schemas.microsoft.com/office/drawing/2014/main" xmlns="" id="{5EC5D1EB-D1D7-3940-BDF3-7764CE42BD62}"/>
               </a:ext>
             </a:extLst>
           </p:cNvPr>
@@ -2813,7 +2812,7 @@
           <p:cNvPr id="3" name="Text Placeholder 2">
             <a:extLst>
               <a:ext uri="{FF2B5EF4-FFF2-40B4-BE49-F238E27FC236}">
-                <a16:creationId xmlns:a16="http://schemas.microsoft.com/office/drawing/2014/main" id="{11AE6F69-9AB5-B14F-9F91-0A1EE72B46B8}"/>
+                <a16:creationId xmlns:a16="http://schemas.microsoft.com/office/drawing/2014/main" xmlns="" id="{11AE6F69-9AB5-B14F-9F91-0A1EE72B46B8}"/>
               </a:ext>
             </a:extLst>
           </p:cNvPr>
@@ -2880,7 +2879,7 @@
           <p:cNvPr id="4" name="Date Placeholder 3">
             <a:extLst>
               <a:ext uri="{FF2B5EF4-FFF2-40B4-BE49-F238E27FC236}">
-                <a16:creationId xmlns:a16="http://schemas.microsoft.com/office/drawing/2014/main" id="{4F30B996-B9DB-2B4D-89FA-1EDF8CE50E93}"/>
+                <a16:creationId xmlns:a16="http://schemas.microsoft.com/office/drawing/2014/main" xmlns="" id="{4F30B996-B9DB-2B4D-89FA-1EDF8CE50E93}"/>
               </a:ext>
             </a:extLst>
           </p:cNvPr>
@@ -2916,7 +2915,7 @@
           <a:p>
             <a:fld id="{36B4F50C-4D11-A04C-BF50-D57EB5FD36C8}" type="datetimeFigureOut">
               <a:rPr lang="en-US" smtClean="0"/>
-              <a:t>6/14/18</a:t>
+              <a:t>27/06/18</a:t>
             </a:fld>
             <a:endParaRPr lang="en-US"/>
           </a:p>
@@ -2927,7 +2926,7 @@
           <p:cNvPr id="5" name="Footer Placeholder 4">
             <a:extLst>
               <a:ext uri="{FF2B5EF4-FFF2-40B4-BE49-F238E27FC236}">
-                <a16:creationId xmlns:a16="http://schemas.microsoft.com/office/drawing/2014/main" id="{CC951C7A-0C9E-B848-92FF-088F96E4D644}"/>
+                <a16:creationId xmlns:a16="http://schemas.microsoft.com/office/drawing/2014/main" xmlns="" id="{CC951C7A-0C9E-B848-92FF-088F96E4D644}"/>
               </a:ext>
             </a:extLst>
           </p:cNvPr>
@@ -2970,7 +2969,7 @@
           <p:cNvPr id="6" name="Slide Number Placeholder 5">
             <a:extLst>
               <a:ext uri="{FF2B5EF4-FFF2-40B4-BE49-F238E27FC236}">
-                <a16:creationId xmlns:a16="http://schemas.microsoft.com/office/drawing/2014/main" id="{EBE81414-2FD7-1B44-A4C0-37B82D186943}"/>
+                <a16:creationId xmlns:a16="http://schemas.microsoft.com/office/drawing/2014/main" xmlns="" id="{EBE81414-2FD7-1B44-A4C0-37B82D186943}"/>
               </a:ext>
             </a:extLst>
           </p:cNvPr>
@@ -3338,7 +3337,7 @@
           <p:cNvPr id="2" name="Title 1">
             <a:extLst>
               <a:ext uri="{FF2B5EF4-FFF2-40B4-BE49-F238E27FC236}">
-                <a16:creationId xmlns:a16="http://schemas.microsoft.com/office/drawing/2014/main" id="{D64D8743-E115-084B-BDDF-F002179024F8}"/>
+                <a16:creationId xmlns:a16="http://schemas.microsoft.com/office/drawing/2014/main" xmlns="" id="{D64D8743-E115-084B-BDDF-F002179024F8}"/>
               </a:ext>
             </a:extLst>
           </p:cNvPr>
@@ -3371,7 +3370,7 @@
           <p:cNvPr id="3" name="Subtitle 2">
             <a:extLst>
               <a:ext uri="{FF2B5EF4-FFF2-40B4-BE49-F238E27FC236}">
-                <a16:creationId xmlns:a16="http://schemas.microsoft.com/office/drawing/2014/main" id="{11666455-97CD-464D-AB4D-759CCD933890}"/>
+                <a16:creationId xmlns:a16="http://schemas.microsoft.com/office/drawing/2014/main" xmlns="" id="{11666455-97CD-464D-AB4D-759CCD933890}"/>
               </a:ext>
             </a:extLst>
           </p:cNvPr>
@@ -3404,7 +3403,7 @@
           <p:cNvPr id="2050" name="Picture 2" descr="Zen motorcycle.jpg">
             <a:extLst>
               <a:ext uri="{FF2B5EF4-FFF2-40B4-BE49-F238E27FC236}">
-                <a16:creationId xmlns:a16="http://schemas.microsoft.com/office/drawing/2014/main" id="{D71D5DC1-2AA6-B848-9F64-9F3E030C37CF}"/>
+                <a16:creationId xmlns:a16="http://schemas.microsoft.com/office/drawing/2014/main" xmlns="" id="{D71D5DC1-2AA6-B848-9F64-9F3E030C37CF}"/>
               </a:ext>
             </a:extLst>
           </p:cNvPr>
@@ -3436,7 +3435,7 @@
           </a:prstGeom>
           <a:noFill/>
           <a:extLst>
-            <a:ext uri="{909E8E84-426E-40DD-AFC4-6F175D3DCCD1}">
+            <a:ext uri="{909E8E84-426E-40dd-AFC4-6F175D3DCCD1}">
               <a14:hiddenFill xmlns:a14="http://schemas.microsoft.com/office/drawing/2010/main">
                 <a:solidFill>
                   <a:srgbClr val="FFFFFF"/>
@@ -3481,7 +3480,7 @@
           <p:cNvPr id="2" name="TextBox 1">
             <a:extLst>
               <a:ext uri="{FF2B5EF4-FFF2-40B4-BE49-F238E27FC236}">
-                <a16:creationId xmlns:a16="http://schemas.microsoft.com/office/drawing/2014/main" id="{390B17E9-6305-B142-9CC7-49EC25D9A58D}"/>
+                <a16:creationId xmlns:a16="http://schemas.microsoft.com/office/drawing/2014/main" xmlns="" id="{390B17E9-6305-B142-9CC7-49EC25D9A58D}"/>
               </a:ext>
             </a:extLst>
           </p:cNvPr>
@@ -3567,7 +3566,7 @@
           <p:cNvPr id="1030" name="Picture 6" descr="Image result for Mars Climate Orbiter">
             <a:extLst>
               <a:ext uri="{FF2B5EF4-FFF2-40B4-BE49-F238E27FC236}">
-                <a16:creationId xmlns:a16="http://schemas.microsoft.com/office/drawing/2014/main" id="{E2839F3C-2132-D949-84CA-6CF979B8C133}"/>
+                <a16:creationId xmlns:a16="http://schemas.microsoft.com/office/drawing/2014/main" xmlns="" id="{E2839F3C-2132-D949-84CA-6CF979B8C133}"/>
               </a:ext>
             </a:extLst>
           </p:cNvPr>
@@ -3599,7 +3598,7 @@
           </a:prstGeom>
           <a:noFill/>
           <a:extLst>
-            <a:ext uri="{909E8E84-426E-40DD-AFC4-6F175D3DCCD1}">
+            <a:ext uri="{909E8E84-426E-40dd-AFC4-6F175D3DCCD1}">
               <a14:hiddenFill xmlns:a14="http://schemas.microsoft.com/office/drawing/2010/main">
                 <a:solidFill>
                   <a:srgbClr val="FFFFFF"/>
@@ -3614,7 +3613,7 @@
           <p:cNvPr id="3" name="TextBox 2">
             <a:extLst>
               <a:ext uri="{FF2B5EF4-FFF2-40B4-BE49-F238E27FC236}">
-                <a16:creationId xmlns:a16="http://schemas.microsoft.com/office/drawing/2014/main" id="{F5AEF3FC-39C2-4A43-A2F8-D7E198E3D532}"/>
+                <a16:creationId xmlns:a16="http://schemas.microsoft.com/office/drawing/2014/main" xmlns="" id="{F5AEF3FC-39C2-4A43-A2F8-D7E198E3D532}"/>
               </a:ext>
             </a:extLst>
           </p:cNvPr>
@@ -3687,7 +3686,7 @@
           <p:cNvPr id="2" name="TextBox 1">
             <a:extLst>
               <a:ext uri="{FF2B5EF4-FFF2-40B4-BE49-F238E27FC236}">
-                <a16:creationId xmlns:a16="http://schemas.microsoft.com/office/drawing/2014/main" id="{390B17E9-6305-B142-9CC7-49EC25D9A58D}"/>
+                <a16:creationId xmlns:a16="http://schemas.microsoft.com/office/drawing/2014/main" xmlns="" id="{390B17E9-6305-B142-9CC7-49EC25D9A58D}"/>
               </a:ext>
             </a:extLst>
           </p:cNvPr>
@@ -3815,7 +3814,7 @@
           <p:cNvPr id="2" name="TextBox 1">
             <a:extLst>
               <a:ext uri="{FF2B5EF4-FFF2-40B4-BE49-F238E27FC236}">
-                <a16:creationId xmlns:a16="http://schemas.microsoft.com/office/drawing/2014/main" id="{390B17E9-6305-B142-9CC7-49EC25D9A58D}"/>
+                <a16:creationId xmlns:a16="http://schemas.microsoft.com/office/drawing/2014/main" xmlns="" id="{390B17E9-6305-B142-9CC7-49EC25D9A58D}"/>
               </a:ext>
             </a:extLst>
           </p:cNvPr>
@@ -4013,7 +4012,7 @@
           <p:cNvPr id="2050" name="Picture 2" descr="https://tiker.net/pub/pudb-screenshot.png">
             <a:extLst>
               <a:ext uri="{FF2B5EF4-FFF2-40B4-BE49-F238E27FC236}">
-                <a16:creationId xmlns:a16="http://schemas.microsoft.com/office/drawing/2014/main" id="{32F57609-C5D1-A244-8386-9BEA724278D7}"/>
+                <a16:creationId xmlns:a16="http://schemas.microsoft.com/office/drawing/2014/main" xmlns="" id="{32F57609-C5D1-A244-8386-9BEA724278D7}"/>
               </a:ext>
             </a:extLst>
           </p:cNvPr>
@@ -4045,7 +4044,7 @@
           </a:prstGeom>
           <a:noFill/>
           <a:extLst>
-            <a:ext uri="{909E8E84-426E-40DD-AFC4-6F175D3DCCD1}">
+            <a:ext uri="{909E8E84-426E-40dd-AFC4-6F175D3DCCD1}">
               <a14:hiddenFill xmlns:a14="http://schemas.microsoft.com/office/drawing/2010/main">
                 <a:solidFill>
                   <a:srgbClr val="FFFFFF"/>
@@ -4090,7 +4089,7 @@
           <p:cNvPr id="2" name="TextBox 1">
             <a:extLst>
               <a:ext uri="{FF2B5EF4-FFF2-40B4-BE49-F238E27FC236}">
-                <a16:creationId xmlns:a16="http://schemas.microsoft.com/office/drawing/2014/main" id="{390B17E9-6305-B142-9CC7-49EC25D9A58D}"/>
+                <a16:creationId xmlns:a16="http://schemas.microsoft.com/office/drawing/2014/main" xmlns="" id="{390B17E9-6305-B142-9CC7-49EC25D9A58D}"/>
               </a:ext>
             </a:extLst>
           </p:cNvPr>
@@ -4423,7 +4422,7 @@
           <p:cNvPr id="3" name="Picture 2">
             <a:extLst>
               <a:ext uri="{FF2B5EF4-FFF2-40B4-BE49-F238E27FC236}">
-                <a16:creationId xmlns:a16="http://schemas.microsoft.com/office/drawing/2014/main" id="{1399CF1E-E13D-4F42-AF2F-1E28FF5D3D4D}"/>
+                <a16:creationId xmlns:a16="http://schemas.microsoft.com/office/drawing/2014/main" xmlns="" id="{1399CF1E-E13D-4F42-AF2F-1E28FF5D3D4D}"/>
               </a:ext>
             </a:extLst>
           </p:cNvPr>
@@ -4483,7 +4482,7 @@
           <p:cNvPr id="2" name="TextBox 1">
             <a:extLst>
               <a:ext uri="{FF2B5EF4-FFF2-40B4-BE49-F238E27FC236}">
-                <a16:creationId xmlns:a16="http://schemas.microsoft.com/office/drawing/2014/main" id="{626D2B06-6FF3-BA49-97EE-D0B2068E6C1D}"/>
+                <a16:creationId xmlns:a16="http://schemas.microsoft.com/office/drawing/2014/main" xmlns="" id="{626D2B06-6FF3-BA49-97EE-D0B2068E6C1D}"/>
               </a:ext>
             </a:extLst>
           </p:cNvPr>
@@ -4591,7 +4590,7 @@
           <p:cNvPr id="1026" name="Picture 2" descr="https://thedailywtf.com/images/18/q2/e312/Pic-2.png">
             <a:extLst>
               <a:ext uri="{FF2B5EF4-FFF2-40B4-BE49-F238E27FC236}">
-                <a16:creationId xmlns:a16="http://schemas.microsoft.com/office/drawing/2014/main" id="{ECEDDAF7-4BD7-EE4F-9248-4E48706C333E}"/>
+                <a16:creationId xmlns:a16="http://schemas.microsoft.com/office/drawing/2014/main" xmlns="" id="{ECEDDAF7-4BD7-EE4F-9248-4E48706C333E}"/>
               </a:ext>
             </a:extLst>
           </p:cNvPr>
@@ -4623,7 +4622,7 @@
           </a:prstGeom>
           <a:noFill/>
           <a:extLst>
-            <a:ext uri="{909E8E84-426E-40DD-AFC4-6F175D3DCCD1}">
+            <a:ext uri="{909E8E84-426E-40dd-AFC4-6F175D3DCCD1}">
               <a14:hiddenFill xmlns:a14="http://schemas.microsoft.com/office/drawing/2010/main">
                 <a:solidFill>
                   <a:srgbClr val="FFFFFF"/>
@@ -4638,7 +4637,7 @@
           <p:cNvPr id="3" name="Rectangle 2">
             <a:extLst>
               <a:ext uri="{FF2B5EF4-FFF2-40B4-BE49-F238E27FC236}">
-                <a16:creationId xmlns:a16="http://schemas.microsoft.com/office/drawing/2014/main" id="{332BEAE4-11B2-6242-A2E4-A68FE757767B}"/>
+                <a16:creationId xmlns:a16="http://schemas.microsoft.com/office/drawing/2014/main" xmlns="" id="{332BEAE4-11B2-6242-A2E4-A68FE757767B}"/>
               </a:ext>
             </a:extLst>
           </p:cNvPr>
@@ -4679,36 +4678,6 @@
     <p:extLst>
       <p:ext uri="{BB962C8B-B14F-4D97-AF65-F5344CB8AC3E}">
         <p14:creationId xmlns:p14="http://schemas.microsoft.com/office/powerpoint/2010/main" val="2423306975"/>
-      </p:ext>
-    </p:extLst>
-  </p:cSld>
-  <p:clrMapOvr>
-    <a:masterClrMapping/>
-  </p:clrMapOvr>
-</p:sld>
-</file>
-
-<file path=ppt/slides/slide8.xml><?xml version="1.0" encoding="utf-8"?>
-<p:sld xmlns:a="http://schemas.openxmlformats.org/drawingml/2006/main" xmlns:r="http://schemas.openxmlformats.org/officeDocument/2006/relationships" xmlns:p="http://schemas.openxmlformats.org/presentationml/2006/main">
-  <p:cSld>
-    <p:spTree>
-      <p:nvGrpSpPr>
-        <p:cNvPr id="1" name=""/>
-        <p:cNvGrpSpPr/>
-        <p:nvPr/>
-      </p:nvGrpSpPr>
-      <p:grpSpPr>
-        <a:xfrm>
-          <a:off x="0" y="0"/>
-          <a:ext cx="0" cy="0"/>
-          <a:chOff x="0" y="0"/>
-          <a:chExt cx="0" cy="0"/>
-        </a:xfrm>
-      </p:grpSpPr>
-    </p:spTree>
-    <p:extLst>
-      <p:ext uri="{BB962C8B-B14F-4D97-AF65-F5344CB8AC3E}">
-        <p14:creationId xmlns:p14="http://schemas.microsoft.com/office/powerpoint/2010/main" val="1847789960"/>
       </p:ext>
     </p:extLst>
   </p:cSld>
@@ -4761,7 +4730,7 @@
     </a:clrScheme>
     <a:fontScheme name="Office">
       <a:majorFont>
-        <a:latin typeface="Calibri Light" panose="020F0302020204030204"/>
+        <a:latin typeface="Calibri Light"/>
         <a:ea typeface=""/>
         <a:cs typeface=""/>
         <a:font script="Jpan" typeface="游ゴシック Light"/>
@@ -4813,7 +4782,7 @@
         <a:font script="Tfng" typeface="Ebrima"/>
       </a:majorFont>
       <a:minorFont>
-        <a:latin typeface="Calibri" panose="020F0502020204030204"/>
+        <a:latin typeface="Calibri"/>
         <a:ea typeface=""/>
         <a:cs typeface=""/>
         <a:font script="Jpan" typeface="游ゴシック"/>
@@ -5007,7 +4976,7 @@
   <a:extraClrSchemeLst/>
   <a:extLst>
     <a:ext uri="{05A4C25C-085E-4340-85A3-A5531E510DB2}">
-      <thm15:themeFamily xmlns:thm15="http://schemas.microsoft.com/office/thememl/2012/main" name="Office Theme" id="{62F939B6-93AF-4DB8-9C6B-D6C7DFDC589F}" vid="{4A3C46E8-61CC-4603-A589-7422A47A8E4A}"/>
+      <thm15:themeFamily xmlns:thm15="http://schemas.microsoft.com/office/thememl/2012/main" xmlns="" name="Office Theme" id="{62F939B6-93AF-4DB8-9C6B-D6C7DFDC589F}" vid="{4A3C46E8-61CC-4603-A589-7422A47A8E4A}"/>
     </a:ext>
   </a:extLst>
 </a:theme>

</xml_diff>